<commit_message>
Added the database Company to the project
</commit_message>
<xml_diff>
--- a/Module4.pptx
+++ b/Module4.pptx
@@ -295,7 +295,7 @@
             <a:fld id="{9E714E4D-90E9-40D8-B241-B3662A19F22D}" type="datetimeFigureOut">
               <a:rPr lang="en-US" smtClean="0"/>
               <a:pPr/>
-              <a:t>11/27/2020</a:t>
+              <a:t>12/4/2020</a:t>
             </a:fld>
             <a:endParaRPr lang="en-IN"/>
           </a:p>
@@ -4307,7 +4307,7 @@
             <a:fld id="{4E8B656A-72DC-4AAE-8B6E-1D0067392640}" type="datetime3">
               <a:rPr lang="en-IN" smtClean="0"/>
               <a:pPr/>
-              <a:t>27 November 2020</a:t>
+              <a:t>4 December 2020</a:t>
             </a:fld>
             <a:endParaRPr lang="en-IN" dirty="0"/>
           </a:p>

</xml_diff>